<commit_message>
add pdf and fix screenshot
</commit_message>
<xml_diff>
--- a/Дипломные документы/Для защиты/090304_18И0997_Корчиков МД.pptx
+++ b/Дипломные документы/Для защиты/090304_18И0997_Корчиков МД.pptx
@@ -23813,7 +23813,7 @@
           <a:p>
             <a:fld id="{52056610-B2B8-4C80-B377-E3C2418411DD}" type="datetimeFigureOut">
               <a:rPr lang="ru-RU" smtClean="0"/>
-              <a:t>05.06.2022</a:t>
+              <a:t>06.06.2022</a:t>
             </a:fld>
             <a:endParaRPr lang="ru-RU"/>
           </a:p>
@@ -23981,7 +23981,7 @@
           <a:p>
             <a:fld id="{52056610-B2B8-4C80-B377-E3C2418411DD}" type="datetimeFigureOut">
               <a:rPr lang="ru-RU" smtClean="0"/>
-              <a:t>05.06.2022</a:t>
+              <a:t>06.06.2022</a:t>
             </a:fld>
             <a:endParaRPr lang="ru-RU"/>
           </a:p>
@@ -24159,7 +24159,7 @@
           <a:p>
             <a:fld id="{52056610-B2B8-4C80-B377-E3C2418411DD}" type="datetimeFigureOut">
               <a:rPr lang="ru-RU" smtClean="0"/>
-              <a:t>05.06.2022</a:t>
+              <a:t>06.06.2022</a:t>
             </a:fld>
             <a:endParaRPr lang="ru-RU"/>
           </a:p>
@@ -24327,7 +24327,7 @@
           <a:p>
             <a:fld id="{52056610-B2B8-4C80-B377-E3C2418411DD}" type="datetimeFigureOut">
               <a:rPr lang="ru-RU" smtClean="0"/>
-              <a:t>05.06.2022</a:t>
+              <a:t>06.06.2022</a:t>
             </a:fld>
             <a:endParaRPr lang="ru-RU"/>
           </a:p>
@@ -24572,7 +24572,7 @@
           <a:p>
             <a:fld id="{52056610-B2B8-4C80-B377-E3C2418411DD}" type="datetimeFigureOut">
               <a:rPr lang="ru-RU" smtClean="0"/>
-              <a:t>05.06.2022</a:t>
+              <a:t>06.06.2022</a:t>
             </a:fld>
             <a:endParaRPr lang="ru-RU"/>
           </a:p>
@@ -24801,7 +24801,7 @@
           <a:p>
             <a:fld id="{52056610-B2B8-4C80-B377-E3C2418411DD}" type="datetimeFigureOut">
               <a:rPr lang="ru-RU" smtClean="0"/>
-              <a:t>05.06.2022</a:t>
+              <a:t>06.06.2022</a:t>
             </a:fld>
             <a:endParaRPr lang="ru-RU"/>
           </a:p>
@@ -25165,7 +25165,7 @@
           <a:p>
             <a:fld id="{52056610-B2B8-4C80-B377-E3C2418411DD}" type="datetimeFigureOut">
               <a:rPr lang="ru-RU" smtClean="0"/>
-              <a:t>05.06.2022</a:t>
+              <a:t>06.06.2022</a:t>
             </a:fld>
             <a:endParaRPr lang="ru-RU"/>
           </a:p>
@@ -25282,7 +25282,7 @@
           <a:p>
             <a:fld id="{52056610-B2B8-4C80-B377-E3C2418411DD}" type="datetimeFigureOut">
               <a:rPr lang="ru-RU" smtClean="0"/>
-              <a:t>05.06.2022</a:t>
+              <a:t>06.06.2022</a:t>
             </a:fld>
             <a:endParaRPr lang="ru-RU"/>
           </a:p>
@@ -25377,7 +25377,7 @@
           <a:p>
             <a:fld id="{52056610-B2B8-4C80-B377-E3C2418411DD}" type="datetimeFigureOut">
               <a:rPr lang="ru-RU" smtClean="0"/>
-              <a:t>05.06.2022</a:t>
+              <a:t>06.06.2022</a:t>
             </a:fld>
             <a:endParaRPr lang="ru-RU"/>
           </a:p>
@@ -25652,7 +25652,7 @@
           <a:p>
             <a:fld id="{52056610-B2B8-4C80-B377-E3C2418411DD}" type="datetimeFigureOut">
               <a:rPr lang="ru-RU" smtClean="0"/>
-              <a:t>05.06.2022</a:t>
+              <a:t>06.06.2022</a:t>
             </a:fld>
             <a:endParaRPr lang="ru-RU"/>
           </a:p>
@@ -25904,7 +25904,7 @@
           <a:p>
             <a:fld id="{52056610-B2B8-4C80-B377-E3C2418411DD}" type="datetimeFigureOut">
               <a:rPr lang="ru-RU" smtClean="0"/>
-              <a:t>05.06.2022</a:t>
+              <a:t>06.06.2022</a:t>
             </a:fld>
             <a:endParaRPr lang="ru-RU"/>
           </a:p>
@@ -26118,7 +26118,7 @@
           <a:p>
             <a:fld id="{52056610-B2B8-4C80-B377-E3C2418411DD}" type="datetimeFigureOut">
               <a:rPr lang="ru-RU" smtClean="0"/>
-              <a:t>05.06.2022</a:t>
+              <a:t>06.06.2022</a:t>
             </a:fld>
             <a:endParaRPr lang="ru-RU"/>
           </a:p>
@@ -28544,7 +28544,7 @@
         </p:blipFill>
         <p:spPr>
           <a:xfrm>
-            <a:off x="885825" y="1590674"/>
+            <a:off x="569941" y="1590674"/>
             <a:ext cx="3328988" cy="4024314"/>
           </a:xfrm>
           <a:prstGeom prst="rect">
@@ -28554,10 +28554,8 @@
       </p:pic>
       <p:pic>
         <p:nvPicPr>
-          <p:cNvPr id="6" name="Рисунок 5"/>
-          <p:cNvPicPr>
-            <a:picLocks noChangeAspect="1"/>
-          </p:cNvPicPr>
+          <p:cNvPr id="7" name="Рисунок 6"/>
+          <p:cNvPicPr/>
           <p:nvPr/>
         </p:nvPicPr>
         <p:blipFill>
@@ -28568,8 +28566,8 @@
         </p:blipFill>
         <p:spPr>
           <a:xfrm>
-            <a:off x="4878491" y="1896807"/>
-            <a:ext cx="6580083" cy="3412048"/>
+            <a:off x="4183092" y="1590674"/>
+            <a:ext cx="7559216" cy="4024314"/>
           </a:xfrm>
           <a:prstGeom prst="rect">
             <a:avLst/>

</xml_diff>